<commit_message>
updated my part a bit
</commit_message>
<xml_diff>
--- a/Meeting 16.11.2016.pptx
+++ b/Meeting 16.11.2016.pptx
@@ -116,6 +116,11 @@
       </a:defRPr>
     </a:lvl9pPr>
   </p:defaultTextStyle>
+  <p:extLst>
+    <p:ext uri="{EFAFB233-063F-42B5-8137-9DF3F51BA10A}">
+      <p15:sldGuideLst xmlns:p15="http://schemas.microsoft.com/office/powerpoint/2012/main"/>
+    </p:ext>
+  </p:extLst>
 </p:presentation>
 </file>
 
@@ -201,7 +206,7 @@
           <a:p>
             <a:fld id="{89C87035-73CA-4634-BBCE-FC13AB9386E6}" type="datetimeFigureOut">
               <a:rPr lang="zh-CN" altLang="en-US" smtClean="0"/>
-              <a:t>2016/11/8</a:t>
+              <a:t>2016/11/16</a:t>
             </a:fld>
             <a:endParaRPr lang="zh-CN" altLang="en-US"/>
           </a:p>
@@ -695,7 +700,7 @@
           <a:p>
             <a:fld id="{1A80A02B-6D5A-4C46-B0B8-5962B0ABBC8E}" type="datetime1">
               <a:rPr lang="zh-CN" altLang="en-US" smtClean="0"/>
-              <a:t>2016/11/8</a:t>
+              <a:t>2016/11/16</a:t>
             </a:fld>
             <a:endParaRPr lang="zh-CN" altLang="en-US"/>
           </a:p>
@@ -869,7 +874,7 @@
           <a:p>
             <a:fld id="{ED024043-38DC-4378-A549-56FA164902C7}" type="datetime1">
               <a:rPr lang="zh-CN" altLang="en-US" smtClean="0"/>
-              <a:t>2016/11/8</a:t>
+              <a:t>2016/11/16</a:t>
             </a:fld>
             <a:endParaRPr lang="zh-CN" altLang="en-US"/>
           </a:p>
@@ -1053,7 +1058,7 @@
           <a:p>
             <a:fld id="{4ED68E9D-D4EC-4CC9-B055-90C478DE826E}" type="datetime1">
               <a:rPr lang="zh-CN" altLang="en-US" smtClean="0"/>
-              <a:t>2016/11/8</a:t>
+              <a:t>2016/11/16</a:t>
             </a:fld>
             <a:endParaRPr lang="zh-CN" altLang="en-US"/>
           </a:p>
@@ -1260,7 +1265,7 @@
           <a:p>
             <a:fld id="{B42F1BA5-B33E-4280-956E-B3AD95BE505C}" type="datetime1">
               <a:rPr lang="zh-CN" altLang="en-US" smtClean="0"/>
-              <a:t>2016/11/8</a:t>
+              <a:t>2016/11/16</a:t>
             </a:fld>
             <a:endParaRPr lang="zh-CN" altLang="en-US"/>
           </a:p>
@@ -1434,7 +1439,7 @@
           <a:p>
             <a:fld id="{CFD8DEC5-6D5C-4BB2-BD38-A98F872FA39A}" type="datetime1">
               <a:rPr lang="zh-CN" altLang="en-US" smtClean="0"/>
-              <a:t>2016/11/8</a:t>
+              <a:t>2016/11/16</a:t>
             </a:fld>
             <a:endParaRPr lang="zh-CN" altLang="en-US"/>
           </a:p>
@@ -1689,7 +1694,7 @@
           <a:p>
             <a:fld id="{368135F3-4224-4A63-A85E-06AE677EC81A}" type="datetime1">
               <a:rPr lang="zh-CN" altLang="en-US" smtClean="0"/>
-              <a:t>2016/11/8</a:t>
+              <a:t>2016/11/16</a:t>
             </a:fld>
             <a:endParaRPr lang="zh-CN" altLang="en-US"/>
           </a:p>
@@ -1925,7 +1930,7 @@
           <a:p>
             <a:fld id="{6BD21D57-B1A5-4176-B754-9F0168BA6525}" type="datetime1">
               <a:rPr lang="zh-CN" altLang="en-US" smtClean="0"/>
-              <a:t>2016/11/8</a:t>
+              <a:t>2016/11/16</a:t>
             </a:fld>
             <a:endParaRPr lang="zh-CN" altLang="en-US"/>
           </a:p>
@@ -2276,7 +2281,7 @@
           <a:p>
             <a:fld id="{3AC7519A-3E27-41E8-94ED-D125378CD3E0}" type="datetime1">
               <a:rPr lang="zh-CN" altLang="en-US" smtClean="0"/>
-              <a:t>2016/11/8</a:t>
+              <a:t>2016/11/16</a:t>
             </a:fld>
             <a:endParaRPr lang="zh-CN" altLang="en-US"/>
           </a:p>
@@ -2398,7 +2403,7 @@
           <a:p>
             <a:fld id="{F7C65A5F-7079-4C54-A2DD-DE2CAA3BA0D5}" type="datetime1">
               <a:rPr lang="zh-CN" altLang="en-US" smtClean="0"/>
-              <a:t>2016/11/8</a:t>
+              <a:t>2016/11/16</a:t>
             </a:fld>
             <a:endParaRPr lang="zh-CN" altLang="en-US"/>
           </a:p>
@@ -2520,7 +2525,7 @@
           <a:p>
             <a:fld id="{A56996FE-0EF8-4666-9AA6-190EDDBED50E}" type="datetime1">
               <a:rPr lang="zh-CN" altLang="en-US" smtClean="0"/>
-              <a:t>2016/11/8</a:t>
+              <a:t>2016/11/16</a:t>
             </a:fld>
             <a:endParaRPr lang="zh-CN" altLang="en-US"/>
           </a:p>
@@ -2808,7 +2813,7 @@
           <a:p>
             <a:fld id="{04528876-3756-4869-BDE4-F29D6B1B500C}" type="datetime1">
               <a:rPr lang="zh-CN" altLang="en-US" smtClean="0"/>
-              <a:t>2016/11/8</a:t>
+              <a:t>2016/11/16</a:t>
             </a:fld>
             <a:endParaRPr lang="zh-CN" altLang="en-US"/>
           </a:p>
@@ -2982,7 +2987,7 @@
           <a:p>
             <a:fld id="{ED7F5435-E027-4257-B466-3797F8D6722E}" type="datetime1">
               <a:rPr lang="zh-CN" altLang="en-US" smtClean="0"/>
-              <a:t>2016/11/8</a:t>
+              <a:t>2016/11/16</a:t>
             </a:fld>
             <a:endParaRPr lang="zh-CN" altLang="en-US"/>
           </a:p>
@@ -3250,7 +3255,7 @@
           <a:p>
             <a:fld id="{27AFA452-3B16-4F38-9858-388A4D51D6B5}" type="datetime1">
               <a:rPr lang="zh-CN" altLang="en-US" smtClean="0"/>
-              <a:t>2016/11/8</a:t>
+              <a:t>2016/11/16</a:t>
             </a:fld>
             <a:endParaRPr lang="zh-CN" altLang="en-US"/>
           </a:p>
@@ -3424,7 +3429,7 @@
           <a:p>
             <a:fld id="{CB7FE3D1-B89B-4949-AFC8-B6559B5F493F}" type="datetime1">
               <a:rPr lang="zh-CN" altLang="en-US" smtClean="0"/>
-              <a:t>2016/11/8</a:t>
+              <a:t>2016/11/16</a:t>
             </a:fld>
             <a:endParaRPr lang="zh-CN" altLang="en-US"/>
           </a:p>
@@ -3608,7 +3613,7 @@
           <a:p>
             <a:fld id="{94F5BB51-222D-4797-933A-A708DDEC7694}" type="datetime1">
               <a:rPr lang="zh-CN" altLang="en-US" smtClean="0"/>
-              <a:t>2016/11/8</a:t>
+              <a:t>2016/11/16</a:t>
             </a:fld>
             <a:endParaRPr lang="zh-CN" altLang="en-US"/>
           </a:p>
@@ -3864,7 +3869,7 @@
           <a:p>
             <a:fld id="{6D70C981-06FE-4E93-8C04-CC58B25722D3}" type="datetime1">
               <a:rPr lang="zh-CN" altLang="en-US" smtClean="0"/>
-              <a:t>2016/11/8</a:t>
+              <a:t>2016/11/16</a:t>
             </a:fld>
             <a:endParaRPr lang="zh-CN" altLang="en-US"/>
           </a:p>
@@ -4213,7 +4218,7 @@
           <a:p>
             <a:fld id="{6B109C23-A2F9-4512-8C7F-98A8660B4720}" type="datetime1">
               <a:rPr lang="zh-CN" altLang="en-US" smtClean="0"/>
-              <a:t>2016/11/8</a:t>
+              <a:t>2016/11/16</a:t>
             </a:fld>
             <a:endParaRPr lang="zh-CN" altLang="en-US"/>
           </a:p>
@@ -4467,7 +4472,7 @@
           <a:p>
             <a:fld id="{73888F19-4144-4138-866B-54048C1F3D26}" type="datetime1">
               <a:rPr lang="zh-CN" altLang="en-US" smtClean="0"/>
-              <a:t>2016/11/8</a:t>
+              <a:t>2016/11/16</a:t>
             </a:fld>
             <a:endParaRPr lang="zh-CN" altLang="en-US"/>
           </a:p>
@@ -4707,7 +4712,7 @@
           <a:p>
             <a:fld id="{9689E59D-0522-4F86-8966-BFB3106EC536}" type="datetime1">
               <a:rPr lang="zh-CN" altLang="en-US" smtClean="0"/>
-              <a:t>2016/11/8</a:t>
+              <a:t>2016/11/16</a:t>
             </a:fld>
             <a:endParaRPr lang="zh-CN" altLang="en-US"/>
           </a:p>
@@ -5093,7 +5098,7 @@
           <a:p>
             <a:fld id="{A449B06F-9E58-4548-BF49-CF718154614F}" type="datetime1">
               <a:rPr lang="zh-CN" altLang="en-US" smtClean="0"/>
-              <a:t>2016/11/8</a:t>
+              <a:t>2016/11/16</a:t>
             </a:fld>
             <a:endParaRPr lang="zh-CN" altLang="en-US"/>
           </a:p>
@@ -5215,7 +5220,7 @@
           <a:p>
             <a:fld id="{517B8222-18E4-457D-B301-9C9B15F75B24}" type="datetime1">
               <a:rPr lang="zh-CN" altLang="en-US" smtClean="0"/>
-              <a:t>2016/11/8</a:t>
+              <a:t>2016/11/16</a:t>
             </a:fld>
             <a:endParaRPr lang="zh-CN" altLang="en-US"/>
           </a:p>
@@ -5314,7 +5319,7 @@
           <a:p>
             <a:fld id="{E5D655FA-D021-46A1-85DC-234B45A09053}" type="datetime1">
               <a:rPr lang="zh-CN" altLang="en-US" smtClean="0"/>
-              <a:t>2016/11/8</a:t>
+              <a:t>2016/11/16</a:t>
             </a:fld>
             <a:endParaRPr lang="zh-CN" altLang="en-US"/>
           </a:p>
@@ -5569,7 +5574,7 @@
           <a:p>
             <a:fld id="{29427B01-9313-4E2F-880D-14EC49EC6A97}" type="datetime1">
               <a:rPr lang="zh-CN" altLang="en-US" smtClean="0"/>
-              <a:t>2016/11/8</a:t>
+              <a:t>2016/11/16</a:t>
             </a:fld>
             <a:endParaRPr lang="zh-CN" altLang="en-US"/>
           </a:p>
@@ -5828,7 +5833,7 @@
           <a:p>
             <a:fld id="{175FCF14-1E30-4D79-BB5C-3D3BD07399EE}" type="datetime1">
               <a:rPr lang="zh-CN" altLang="en-US" smtClean="0"/>
-              <a:t>2016/11/8</a:t>
+              <a:t>2016/11/16</a:t>
             </a:fld>
             <a:endParaRPr lang="zh-CN" altLang="en-US"/>
           </a:p>
@@ -6115,7 +6120,7 @@
           <a:p>
             <a:fld id="{C8AD3DFC-7E59-41F8-8E91-FAEFC6A382FD}" type="datetime1">
               <a:rPr lang="zh-CN" altLang="en-US" smtClean="0"/>
-              <a:t>2016/11/8</a:t>
+              <a:t>2016/11/16</a:t>
             </a:fld>
             <a:endParaRPr lang="zh-CN" altLang="en-US"/>
           </a:p>
@@ -6380,7 +6385,7 @@
           <a:p>
             <a:fld id="{BC5CF7C4-DB54-4563-A16C-82A51ED85B5D}" type="datetime1">
               <a:rPr lang="zh-CN" altLang="en-US" smtClean="0"/>
-              <a:t>2016/11/8</a:t>
+              <a:t>2016/11/16</a:t>
             </a:fld>
             <a:endParaRPr lang="zh-CN" altLang="en-US"/>
           </a:p>
@@ -6634,7 +6639,7 @@
           <a:p>
             <a:fld id="{EC4FCF9D-AB2E-45F3-BDAF-33ACFB207126}" type="datetime1">
               <a:rPr lang="zh-CN" altLang="en-US" smtClean="0"/>
-              <a:t>2016/11/8</a:t>
+              <a:t>2016/11/16</a:t>
             </a:fld>
             <a:endParaRPr lang="zh-CN" altLang="en-US"/>
           </a:p>
@@ -6946,7 +6951,7 @@
           <a:p>
             <a:fld id="{4DB7F0A1-8D22-4DEB-AD22-0C817EC2D821}" type="datetime1">
               <a:rPr lang="zh-CN" altLang="en-US" smtClean="0"/>
-              <a:t>2016/11/8</a:t>
+              <a:t>2016/11/16</a:t>
             </a:fld>
             <a:endParaRPr lang="zh-CN" altLang="en-US"/>
           </a:p>
@@ -7268,7 +7273,7 @@
           <a:p>
             <a:fld id="{1129AD67-5B98-41D5-B82E-5995DB4ABE97}" type="datetime1">
               <a:rPr lang="zh-CN" altLang="en-US" smtClean="0"/>
-              <a:t>2016/11/8</a:t>
+              <a:t>2016/11/16</a:t>
             </a:fld>
             <a:endParaRPr lang="zh-CN" altLang="en-US"/>
           </a:p>
@@ -7574,7 +7579,7 @@
           <a:p>
             <a:fld id="{1B8A807A-2DAC-4C84-AF54-8D6C1076B8F6}" type="datetime1">
               <a:rPr lang="zh-CN" altLang="en-US" smtClean="0"/>
-              <a:t>2016/11/8</a:t>
+              <a:t>2016/11/16</a:t>
             </a:fld>
             <a:endParaRPr lang="zh-CN" altLang="en-US"/>
           </a:p>
@@ -7945,7 +7950,7 @@
           <a:p>
             <a:fld id="{EE5E6368-998B-440D-9D46-98A6962C87B6}" type="datetime1">
               <a:rPr lang="zh-CN" altLang="en-US" smtClean="0"/>
-              <a:t>2016/11/8</a:t>
+              <a:t>2016/11/16</a:t>
             </a:fld>
             <a:endParaRPr lang="zh-CN" altLang="en-US"/>
           </a:p>
@@ -8123,7 +8128,7 @@
           <a:p>
             <a:fld id="{B94CF2AF-3405-4DAD-A8A3-29871F11704A}" type="datetime1">
               <a:rPr lang="zh-CN" altLang="en-US" smtClean="0"/>
-              <a:t>2016/11/8</a:t>
+              <a:t>2016/11/16</a:t>
             </a:fld>
             <a:endParaRPr lang="zh-CN" altLang="en-US"/>
           </a:p>
@@ -8307,7 +8312,7 @@
           <a:p>
             <a:fld id="{0E6ADDBB-094F-4F6A-B054-CCC7A189536E}" type="datetime1">
               <a:rPr lang="zh-CN" altLang="en-US" smtClean="0"/>
-              <a:t>2016/11/8</a:t>
+              <a:t>2016/11/16</a:t>
             </a:fld>
             <a:endParaRPr lang="zh-CN" altLang="en-US"/>
           </a:p>
@@ -8543,7 +8548,7 @@
           <a:p>
             <a:fld id="{E75E87F7-D328-4911-A1AB-7F8617A214AF}" type="datetime1">
               <a:rPr lang="zh-CN" altLang="en-US" smtClean="0"/>
-              <a:t>2016/11/8</a:t>
+              <a:t>2016/11/16</a:t>
             </a:fld>
             <a:endParaRPr lang="zh-CN" altLang="en-US"/>
           </a:p>
@@ -8894,7 +8899,7 @@
           <a:p>
             <a:fld id="{11577BCD-2888-4AC1-9E37-B2001FB75500}" type="datetime1">
               <a:rPr lang="zh-CN" altLang="en-US" smtClean="0"/>
-              <a:t>2016/11/8</a:t>
+              <a:t>2016/11/16</a:t>
             </a:fld>
             <a:endParaRPr lang="zh-CN" altLang="en-US"/>
           </a:p>
@@ -9016,7 +9021,7 @@
           <a:p>
             <a:fld id="{C5653F2D-BB5C-464D-A194-C73863E2BEFA}" type="datetime1">
               <a:rPr lang="zh-CN" altLang="en-US" smtClean="0"/>
-              <a:t>2016/11/8</a:t>
+              <a:t>2016/11/16</a:t>
             </a:fld>
             <a:endParaRPr lang="zh-CN" altLang="en-US"/>
           </a:p>
@@ -9138,7 +9143,7 @@
           <a:p>
             <a:fld id="{115C71BC-7954-4971-922B-A4EDD0BD39FC}" type="datetime1">
               <a:rPr lang="zh-CN" altLang="en-US" smtClean="0"/>
-              <a:t>2016/11/8</a:t>
+              <a:t>2016/11/16</a:t>
             </a:fld>
             <a:endParaRPr lang="zh-CN" altLang="en-US"/>
           </a:p>
@@ -9426,7 +9431,7 @@
           <a:p>
             <a:fld id="{FCD6DD69-DCCF-4D51-9637-D75D564678D8}" type="datetime1">
               <a:rPr lang="zh-CN" altLang="en-US" smtClean="0"/>
-              <a:t>2016/11/8</a:t>
+              <a:t>2016/11/16</a:t>
             </a:fld>
             <a:endParaRPr lang="zh-CN" altLang="en-US"/>
           </a:p>
@@ -9694,7 +9699,7 @@
           <a:p>
             <a:fld id="{5044FDE2-5050-4F8D-BA11-F91A8864FF85}" type="datetime1">
               <a:rPr lang="zh-CN" altLang="en-US" smtClean="0"/>
-              <a:t>2016/11/8</a:t>
+              <a:t>2016/11/16</a:t>
             </a:fld>
             <a:endParaRPr lang="zh-CN" altLang="en-US"/>
           </a:p>
@@ -9912,7 +9917,7 @@
           <a:p>
             <a:fld id="{BB04FB06-401C-4FCB-A024-0A60131AF1D6}" type="datetime1">
               <a:rPr lang="zh-CN" altLang="en-US" smtClean="0"/>
-              <a:t>2016/11/8</a:t>
+              <a:t>2016/11/16</a:t>
             </a:fld>
             <a:endParaRPr lang="zh-CN" altLang="en-US"/>
           </a:p>
@@ -10447,7 +10452,7 @@
           <a:p>
             <a:fld id="{721D90D5-2A1B-4484-8163-3925CF5E9BEE}" type="datetime1">
               <a:rPr lang="zh-CN" altLang="en-US" smtClean="0"/>
-              <a:t>2016/11/8</a:t>
+              <a:t>2016/11/16</a:t>
             </a:fld>
             <a:endParaRPr lang="zh-CN" altLang="en-US"/>
           </a:p>
@@ -11174,7 +11179,7 @@
           <a:p>
             <a:fld id="{A96DABEB-7BFF-4156-9050-FDDB581E055D}" type="datetime1">
               <a:rPr lang="zh-CN" altLang="en-US" smtClean="0"/>
-              <a:t>2016/11/8</a:t>
+              <a:t>2016/11/16</a:t>
             </a:fld>
             <a:endParaRPr lang="zh-CN" altLang="en-US"/>
           </a:p>
@@ -11824,13 +11829,13 @@
   <p:clrMapOvr>
     <a:masterClrMapping/>
   </p:clrMapOvr>
-  <mc:AlternateContent xmlns:mc="http://schemas.openxmlformats.org/markup-compatibility/2006">
-    <mc:Choice xmlns:p14="http://schemas.microsoft.com/office/powerpoint/2010/main" Requires="p14">
+  <mc:AlternateContent xmlns:mc="http://schemas.openxmlformats.org/markup-compatibility/2006" xmlns:p14="http://schemas.microsoft.com/office/powerpoint/2010/main">
+    <mc:Choice Requires="p14">
       <p:transition spd="slow" p14:dur="1600">
         <p14:conveyor dir="l"/>
       </p:transition>
     </mc:Choice>
-    <mc:Fallback>
+    <mc:Fallback xmlns="">
       <p:transition spd="slow">
         <p:fade/>
       </p:transition>
@@ -12049,13 +12054,13 @@
   <p:clrMapOvr>
     <a:masterClrMapping/>
   </p:clrMapOvr>
-  <mc:AlternateContent xmlns:mc="http://schemas.openxmlformats.org/markup-compatibility/2006">
-    <mc:Choice xmlns:p14="http://schemas.microsoft.com/office/powerpoint/2010/main" Requires="p14">
+  <mc:AlternateContent xmlns:mc="http://schemas.openxmlformats.org/markup-compatibility/2006" xmlns:p14="http://schemas.microsoft.com/office/powerpoint/2010/main">
+    <mc:Choice Requires="p14">
       <p:transition spd="slow" p14:dur="1600">
         <p14:conveyor dir="l"/>
       </p:transition>
     </mc:Choice>
-    <mc:Fallback>
+    <mc:Fallback xmlns="">
       <p:transition spd="slow">
         <p:fade/>
       </p:transition>
@@ -12349,13 +12354,13 @@
   <p:clrMapOvr>
     <a:masterClrMapping/>
   </p:clrMapOvr>
-  <mc:AlternateContent xmlns:mc="http://schemas.openxmlformats.org/markup-compatibility/2006">
-    <mc:Choice xmlns:p14="http://schemas.microsoft.com/office/powerpoint/2010/main" Requires="p14">
+  <mc:AlternateContent xmlns:mc="http://schemas.openxmlformats.org/markup-compatibility/2006" xmlns:p14="http://schemas.microsoft.com/office/powerpoint/2010/main">
+    <mc:Choice Requires="p14">
       <p:transition spd="slow" p14:dur="1600">
         <p14:conveyor dir="l"/>
       </p:transition>
     </mc:Choice>
-    <mc:Fallback>
+    <mc:Fallback xmlns="">
       <p:transition spd="slow">
         <p:fade/>
       </p:transition>
@@ -12510,13 +12515,13 @@
   <p:clrMapOvr>
     <a:masterClrMapping/>
   </p:clrMapOvr>
-  <mc:AlternateContent xmlns:mc="http://schemas.openxmlformats.org/markup-compatibility/2006">
-    <mc:Choice xmlns:p14="http://schemas.microsoft.com/office/powerpoint/2010/main" Requires="p14">
+  <mc:AlternateContent xmlns:mc="http://schemas.openxmlformats.org/markup-compatibility/2006" xmlns:p14="http://schemas.microsoft.com/office/powerpoint/2010/main">
+    <mc:Choice Requires="p14">
       <p:transition spd="slow" p14:dur="1600">
         <p14:conveyor dir="l"/>
       </p:transition>
     </mc:Choice>
-    <mc:Fallback>
+    <mc:Fallback xmlns="">
       <p:transition spd="slow">
         <p:fade/>
       </p:transition>
@@ -12874,13 +12879,13 @@
   <p:clrMapOvr>
     <a:masterClrMapping/>
   </p:clrMapOvr>
-  <mc:AlternateContent xmlns:mc="http://schemas.openxmlformats.org/markup-compatibility/2006">
-    <mc:Choice xmlns:p14="http://schemas.microsoft.com/office/powerpoint/2010/main" Requires="p14">
+  <mc:AlternateContent xmlns:mc="http://schemas.openxmlformats.org/markup-compatibility/2006" xmlns:p14="http://schemas.microsoft.com/office/powerpoint/2010/main">
+    <mc:Choice Requires="p14">
       <p:transition spd="slow" p14:dur="1600">
         <p14:conveyor dir="l"/>
       </p:transition>
     </mc:Choice>
-    <mc:Fallback>
+    <mc:Fallback xmlns="">
       <p:transition spd="slow">
         <p:fade/>
       </p:transition>
@@ -13000,7 +13005,7 @@
         <p:spPr>
           <a:xfrm>
             <a:off x="684212" y="2621598"/>
-            <a:ext cx="7266714" cy="2176826"/>
+            <a:ext cx="10136188" cy="3410902"/>
           </a:xfrm>
         </p:spPr>
         <p:txBody>
@@ -13009,13 +13014,17 @@
           </a:bodyPr>
           <a:lstStyle/>
           <a:p>
-            <a:r>
-              <a:rPr lang="en-US" altLang="zh-CN" dirty="0">
+            <a:pPr marL="457200" indent="-457200">
+              <a:buFont typeface="+mj-lt"/>
+              <a:buAutoNum type="arabicPeriod"/>
+            </a:pPr>
+            <a:r>
+              <a:rPr lang="en-US" altLang="zh-CN" dirty="0" smtClean="0">
                 <a:solidFill>
                   <a:schemeClr val="bg1"/>
                 </a:solidFill>
               </a:rPr>
-              <a:t>1. Account </a:t>
+              <a:t>Account </a:t>
             </a:r>
             <a:r>
               <a:rPr lang="en-US" altLang="zh-CN" dirty="0" smtClean="0">
@@ -13039,7 +13048,73 @@
                   <a:schemeClr val="bg1"/>
                 </a:solidFill>
               </a:rPr>
-              <a:t>– Yet Not implemented</a:t>
+              <a:t>– Yet Not </a:t>
+            </a:r>
+            <a:r>
+              <a:rPr lang="en-US" altLang="zh-CN" dirty="0" smtClean="0">
+                <a:solidFill>
+                  <a:schemeClr val="bg1"/>
+                </a:solidFill>
+              </a:rPr>
+              <a:t>implemented</a:t>
+            </a:r>
+          </a:p>
+          <a:p>
+            <a:pPr marL="457200" indent="-457200">
+              <a:buFont typeface="+mj-lt"/>
+              <a:buAutoNum type="arabicPeriod"/>
+            </a:pPr>
+            <a:r>
+              <a:rPr lang="en-US" altLang="zh-CN" dirty="0" smtClean="0">
+                <a:solidFill>
+                  <a:schemeClr val="bg1"/>
+                </a:solidFill>
+              </a:rPr>
+              <a:t>Project Architecture – Done for current iteration.</a:t>
+            </a:r>
+          </a:p>
+          <a:p>
+            <a:pPr marL="457200" indent="-457200">
+              <a:buFont typeface="+mj-lt"/>
+              <a:buAutoNum type="arabicPeriod"/>
+            </a:pPr>
+            <a:r>
+              <a:rPr lang="en-US" altLang="zh-CN" dirty="0" smtClean="0">
+                <a:solidFill>
+                  <a:schemeClr val="bg1"/>
+                </a:solidFill>
+              </a:rPr>
+              <a:t>Database design – partially done, 50%</a:t>
+            </a:r>
+          </a:p>
+          <a:p>
+            <a:pPr marL="457200" indent="-457200">
+              <a:buFont typeface="+mj-lt"/>
+              <a:buAutoNum type="arabicPeriod"/>
+            </a:pPr>
+            <a:r>
+              <a:rPr lang="en-US" altLang="zh-CN" dirty="0" smtClean="0">
+                <a:solidFill>
+                  <a:schemeClr val="bg1"/>
+                </a:solidFill>
+              </a:rPr>
+              <a:t>All </a:t>
+            </a:r>
+            <a:r>
+              <a:rPr lang="en-US" altLang="zh-CN" dirty="0">
+                <a:solidFill>
+                  <a:schemeClr val="bg1"/>
+                </a:solidFill>
+              </a:rPr>
+              <a:t>game </a:t>
+            </a:r>
+            <a:r>
+              <a:rPr lang="en-US" altLang="zh-CN" dirty="0" smtClean="0">
+                <a:solidFill>
+                  <a:schemeClr val="bg1"/>
+                </a:solidFill>
+              </a:rPr>
+              <a:t>operations - Almost done. 90%</a:t>
             </a:r>
             <a:endParaRPr lang="en-US" altLang="zh-CN" dirty="0">
               <a:solidFill>
@@ -13048,13 +13123,25 @@
             </a:endParaRPr>
           </a:p>
           <a:p>
+            <a:pPr marL="457200" indent="-457200">
+              <a:buFont typeface="+mj-lt"/>
+              <a:buAutoNum type="arabicPeriod"/>
+            </a:pPr>
+            <a:r>
+              <a:rPr lang="en-US" altLang="zh-CN" dirty="0" smtClean="0">
+                <a:solidFill>
+                  <a:schemeClr val="bg1"/>
+                </a:solidFill>
+              </a:rPr>
+              <a:t>Game </a:t>
+            </a:r>
             <a:r>
               <a:rPr lang="en-US" altLang="zh-CN" dirty="0">
                 <a:solidFill>
                   <a:schemeClr val="bg1"/>
                 </a:solidFill>
               </a:rPr>
-              <a:t>2. All game </a:t>
+              <a:t>setting(Sound setting</a:t>
             </a:r>
             <a:r>
               <a:rPr lang="en-US" altLang="zh-CN" dirty="0" smtClean="0">
@@ -13062,7 +13149,7 @@
                   <a:schemeClr val="bg1"/>
                 </a:solidFill>
               </a:rPr>
-              <a:t>operations - Almost done. 90%</a:t>
+              <a:t>) - partially done, 50%</a:t>
             </a:r>
             <a:endParaRPr lang="en-US" altLang="zh-CN" dirty="0">
               <a:solidFill>
@@ -13071,21 +13158,25 @@
             </a:endParaRPr>
           </a:p>
           <a:p>
+            <a:pPr marL="457200" indent="-457200">
+              <a:buFont typeface="+mj-lt"/>
+              <a:buAutoNum type="arabicPeriod"/>
+            </a:pPr>
             <a:r>
               <a:rPr lang="en-US" altLang="zh-CN" dirty="0" smtClean="0">
                 <a:solidFill>
                   <a:schemeClr val="bg1"/>
                 </a:solidFill>
               </a:rPr>
-              <a:t>3</a:t>
-            </a:r>
-            <a:r>
-              <a:rPr lang="en-US" altLang="zh-CN" dirty="0">
+              <a:t>Lobby </a:t>
+            </a:r>
+            <a:r>
+              <a:rPr lang="en-US" altLang="zh-CN" dirty="0" smtClean="0">
                 <a:solidFill>
                   <a:schemeClr val="bg1"/>
                 </a:solidFill>
               </a:rPr>
-              <a:t>. Game setting(Sound setting</a:t>
+              <a:t>system - Almost done 90</a:t>
             </a:r>
             <a:r>
               <a:rPr lang="en-US" altLang="zh-CN" dirty="0" smtClean="0">
@@ -13093,30 +13184,21 @@
                   <a:schemeClr val="bg1"/>
                 </a:solidFill>
               </a:rPr>
-              <a:t>) - partially done, 50%</a:t>
-            </a:r>
-            <a:endParaRPr lang="en-US" altLang="zh-CN" dirty="0">
-              <a:solidFill>
-                <a:schemeClr val="bg1"/>
-              </a:solidFill>
-            </a:endParaRPr>
-          </a:p>
-          <a:p>
-            <a:r>
-              <a:rPr lang="en-US" altLang="zh-CN" dirty="0">
+              <a:t>%</a:t>
+            </a:r>
+          </a:p>
+          <a:p>
+            <a:pPr marL="457200" indent="-457200">
+              <a:buFont typeface="+mj-lt"/>
+              <a:buAutoNum type="arabicPeriod"/>
+            </a:pPr>
+            <a:r>
+              <a:rPr lang="en-US" altLang="zh-CN" dirty="0" smtClean="0">
                 <a:solidFill>
                   <a:schemeClr val="bg1"/>
                 </a:solidFill>
               </a:rPr>
-              <a:t>4. Lobby </a:t>
-            </a:r>
-            <a:r>
-              <a:rPr lang="en-US" altLang="zh-CN" dirty="0" smtClean="0">
-                <a:solidFill>
-                  <a:schemeClr val="bg1"/>
-                </a:solidFill>
-              </a:rPr>
-              <a:t>system - Almost done 90%</a:t>
+              <a:t>UI (User interface) – partially done, 50%</a:t>
             </a:r>
             <a:endParaRPr lang="en-US" altLang="zh-CN" dirty="0">
               <a:solidFill>
@@ -13136,13 +13218,13 @@
   <p:clrMapOvr>
     <a:masterClrMapping/>
   </p:clrMapOvr>
-  <mc:AlternateContent xmlns:mc="http://schemas.openxmlformats.org/markup-compatibility/2006">
-    <mc:Choice xmlns:p14="http://schemas.microsoft.com/office/powerpoint/2010/main" Requires="p14">
+  <mc:AlternateContent xmlns:mc="http://schemas.openxmlformats.org/markup-compatibility/2006" xmlns:p14="http://schemas.microsoft.com/office/powerpoint/2010/main">
+    <mc:Choice Requires="p14">
       <p:transition spd="slow" p14:dur="1600">
         <p14:conveyor dir="l"/>
       </p:transition>
     </mc:Choice>
-    <mc:Fallback>
+    <mc:Fallback xmlns="">
       <p:transition spd="slow">
         <p:fade/>
       </p:transition>
@@ -13283,13 +13365,13 @@
   <p:clrMapOvr>
     <a:masterClrMapping/>
   </p:clrMapOvr>
-  <mc:AlternateContent xmlns:mc="http://schemas.openxmlformats.org/markup-compatibility/2006">
-    <mc:Choice xmlns:p14="http://schemas.microsoft.com/office/powerpoint/2010/main" Requires="p14">
+  <mc:AlternateContent xmlns:mc="http://schemas.openxmlformats.org/markup-compatibility/2006" xmlns:p14="http://schemas.microsoft.com/office/powerpoint/2010/main">
+    <mc:Choice Requires="p14">
       <p:transition spd="slow" p14:dur="1600">
         <p14:conveyor dir="l"/>
       </p:transition>
     </mc:Choice>
-    <mc:Fallback>
+    <mc:Fallback xmlns="">
       <p:transition spd="slow">
         <p:fade/>
       </p:transition>
@@ -13406,13 +13488,13 @@
   <p:clrMapOvr>
     <a:masterClrMapping/>
   </p:clrMapOvr>
-  <mc:AlternateContent xmlns:mc="http://schemas.openxmlformats.org/markup-compatibility/2006">
-    <mc:Choice xmlns:p14="http://schemas.microsoft.com/office/powerpoint/2010/main" Requires="p14">
+  <mc:AlternateContent xmlns:mc="http://schemas.openxmlformats.org/markup-compatibility/2006" xmlns:p14="http://schemas.microsoft.com/office/powerpoint/2010/main">
+    <mc:Choice Requires="p14">
       <p:transition spd="slow" p14:dur="1600">
         <p14:conveyor dir="l"/>
       </p:transition>
     </mc:Choice>
-    <mc:Fallback>
+    <mc:Fallback xmlns="">
       <p:transition spd="slow">
         <p:fade/>
       </p:transition>

</xml_diff>